<commit_message>
v05 - alteracao da apresentacao ppt feim
</commit_message>
<xml_diff>
--- a/doc/apresentacoes_aulas/analise_requisitos_v4_en.pptx
+++ b/doc/apresentacoes_aulas/analise_requisitos_v4_en.pptx
@@ -243,7 +243,7 @@
           <a:p>
             <a:fld id="{A24D64F2-8D2F-4562-9CDF-47C62C39CBC4}" type="datetimeFigureOut">
               <a:rPr lang="pt-PT" smtClean="0"/>
-              <a:t>23/05/2022</a:t>
+              <a:t>25/05/2022</a:t>
             </a:fld>
             <a:endParaRPr lang="pt-PT"/>
           </a:p>
@@ -424,7 +424,7 @@
           <a:p>
             <a:fld id="{ED6AF0AB-F1AE-4A7B-935F-50D822EBB173}" type="datetimeFigureOut">
               <a:rPr lang="pt-PT" smtClean="0"/>
-              <a:t>23/05/2022</a:t>
+              <a:t>25/05/2022</a:t>
             </a:fld>
             <a:endParaRPr lang="pt-PT"/>
           </a:p>
@@ -739,6 +739,14 @@
           <a:bodyPr/>
           <a:lstStyle/>
           <a:p>
+            <a:r>
+              <a:rPr lang="pt-PT" dirty="0"/>
+              <a:t>Estas características podem ser obtidas através da biblioteca </a:t>
+            </a:r>
+            <a:r>
+              <a:rPr lang="pt-PT" dirty="0" err="1"/>
+              <a:t>librosa</a:t>
+            </a:r>
             <a:endParaRPr lang="pt-PT" dirty="0"/>
           </a:p>
         </p:txBody>
@@ -1733,7 +1741,7 @@
           <a:p>
             <a:fld id="{EA1EF9DC-A4B7-44B9-829B-170B18FA51F2}" type="datetime1">
               <a:rPr lang="pt-PT" smtClean="0"/>
-              <a:t>23/05/2022</a:t>
+              <a:t>25/05/2022</a:t>
             </a:fld>
             <a:endParaRPr lang="pt-PT"/>
           </a:p>
@@ -1934,7 +1942,7 @@
           <a:p>
             <a:fld id="{79E46C79-9EB6-4A4E-A9BE-FC1EC3349A6E}" type="datetime1">
               <a:rPr lang="pt-PT" smtClean="0"/>
-              <a:t>23/05/2022</a:t>
+              <a:t>25/05/2022</a:t>
             </a:fld>
             <a:endParaRPr lang="pt-PT"/>
           </a:p>
@@ -2145,7 +2153,7 @@
           <a:p>
             <a:fld id="{064777D9-D73A-405A-903A-342478192F53}" type="datetime1">
               <a:rPr lang="pt-PT" smtClean="0"/>
-              <a:t>23/05/2022</a:t>
+              <a:t>25/05/2022</a:t>
             </a:fld>
             <a:endParaRPr lang="pt-PT"/>
           </a:p>
@@ -2346,7 +2354,7 @@
           <a:p>
             <a:fld id="{B652B923-C52A-4205-AEC1-E79727CBC042}" type="datetime1">
               <a:rPr lang="pt-PT" smtClean="0"/>
-              <a:t>23/05/2022</a:t>
+              <a:t>25/05/2022</a:t>
             </a:fld>
             <a:endParaRPr lang="pt-PT"/>
           </a:p>
@@ -2624,7 +2632,7 @@
           <a:p>
             <a:fld id="{DB2D34F1-63BF-4D1B-BE9A-C43AD7C42034}" type="datetime1">
               <a:rPr lang="pt-PT" smtClean="0"/>
-              <a:t>23/05/2022</a:t>
+              <a:t>25/05/2022</a:t>
             </a:fld>
             <a:endParaRPr lang="pt-PT"/>
           </a:p>
@@ -2892,7 +2900,7 @@
           <a:p>
             <a:fld id="{B2A192F1-747D-4F34-BE67-62FE5F119266}" type="datetime1">
               <a:rPr lang="pt-PT" smtClean="0"/>
-              <a:t>23/05/2022</a:t>
+              <a:t>25/05/2022</a:t>
             </a:fld>
             <a:endParaRPr lang="pt-PT"/>
           </a:p>
@@ -3307,7 +3315,7 @@
           <a:p>
             <a:fld id="{DD86D9F2-0E85-4EEB-9053-6298B8DCE443}" type="datetime1">
               <a:rPr lang="pt-PT" smtClean="0"/>
-              <a:t>23/05/2022</a:t>
+              <a:t>25/05/2022</a:t>
             </a:fld>
             <a:endParaRPr lang="pt-PT"/>
           </a:p>
@@ -3451,7 +3459,7 @@
           <a:p>
             <a:fld id="{B07619BF-5A2E-48D8-AC1B-65F0C1FFA8B0}" type="datetime1">
               <a:rPr lang="pt-PT" smtClean="0"/>
-              <a:t>23/05/2022</a:t>
+              <a:t>25/05/2022</a:t>
             </a:fld>
             <a:endParaRPr lang="pt-PT"/>
           </a:p>
@@ -3567,7 +3575,7 @@
           <a:p>
             <a:fld id="{FC965847-A818-4554-AF2C-AA70219A41AD}" type="datetime1">
               <a:rPr lang="pt-PT" smtClean="0"/>
-              <a:t>23/05/2022</a:t>
+              <a:t>25/05/2022</a:t>
             </a:fld>
             <a:endParaRPr lang="pt-PT"/>
           </a:p>
@@ -3881,7 +3889,7 @@
           <a:p>
             <a:fld id="{60DE2D3B-2697-4821-8F54-7FE3F3349A41}" type="datetime1">
               <a:rPr lang="pt-PT" smtClean="0"/>
-              <a:t>23/05/2022</a:t>
+              <a:t>25/05/2022</a:t>
             </a:fld>
             <a:endParaRPr lang="pt-PT"/>
           </a:p>
@@ -4172,7 +4180,7 @@
           <a:p>
             <a:fld id="{2E7CF050-556F-4710-AAD6-BC24B738A409}" type="datetime1">
               <a:rPr lang="pt-PT" smtClean="0"/>
-              <a:t>23/05/2022</a:t>
+              <a:t>25/05/2022</a:t>
             </a:fld>
             <a:endParaRPr lang="pt-PT"/>
           </a:p>
@@ -4416,7 +4424,7 @@
           <a:p>
             <a:fld id="{AD47F3F2-C837-41AF-A46E-BBB7A868F754}" type="datetime1">
               <a:rPr lang="pt-PT" smtClean="0"/>
-              <a:t>23/05/2022</a:t>
+              <a:t>25/05/2022</a:t>
             </a:fld>
             <a:endParaRPr lang="pt-PT"/>
           </a:p>
@@ -5935,7 +5943,7 @@
                 <a:latin typeface="Arial" panose="020B0604020202020204" pitchFamily="34" charset="0"/>
                 <a:cs typeface="Arial" panose="020B0604020202020204" pitchFamily="34" charset="0"/>
               </a:rPr>
-              <a:t>Supervisors</a:t>
+              <a:t>Advisors</a:t>
             </a:r>
             <a:r>
               <a:rPr lang="pt-PT" sz="1200" dirty="0">
@@ -7053,8 +7061,8 @@
         </p:blipFill>
         <p:spPr>
           <a:xfrm>
-            <a:off x="2015612" y="2249275"/>
-            <a:ext cx="7949173" cy="4243600"/>
+            <a:off x="1651820" y="2249275"/>
+            <a:ext cx="8312966" cy="4437808"/>
           </a:xfrm>
           <a:prstGeom prst="rect">
             <a:avLst/>
@@ -8898,7 +8906,11 @@
             </a:r>
             <a:r>
               <a:rPr lang="pt-PT" sz="2000" dirty="0"/>
-              <a:t> Flux</a:t>
+              <a:t> </a:t>
+            </a:r>
+            <a:r>
+              <a:rPr lang="pt-PT" sz="2000" b="1" dirty="0"/>
+              <a:t>Flux</a:t>
             </a:r>
           </a:p>
           <a:p>
@@ -10332,7 +10344,7 @@
         </p:nvSpPr>
         <p:spPr>
           <a:xfrm>
-            <a:off x="0" y="0"/>
+            <a:off x="0" y="-19664"/>
             <a:ext cx="12192000" cy="1542803"/>
           </a:xfrm>
           <a:prstGeom prst="rect">
@@ -10398,24 +10410,6 @@
                 <a:latin typeface="+mn-lt"/>
               </a:rPr>
               <a:t>Dataset</a:t>
-            </a:r>
-            <a:r>
-              <a:rPr lang="pt-PT" sz="4000" dirty="0">
-                <a:solidFill>
-                  <a:schemeClr val="bg1"/>
-                </a:solidFill>
-                <a:latin typeface="+mn-lt"/>
-              </a:rPr>
-              <a:t> </a:t>
-            </a:r>
-            <a:r>
-              <a:rPr lang="pt-PT" sz="4000" dirty="0" err="1">
-                <a:solidFill>
-                  <a:schemeClr val="bg1"/>
-                </a:solidFill>
-                <a:latin typeface="+mn-lt"/>
-              </a:rPr>
-              <a:t>Construction</a:t>
             </a:r>
             <a:br>
               <a:rPr lang="pt-PT" sz="4800" dirty="0"/>
@@ -11332,7 +11326,7 @@
                 <a:ea typeface="Calibri" panose="020F0502020204030204" pitchFamily="34" charset="0"/>
                 <a:cs typeface="Times New Roman" panose="02020603050405020304" pitchFamily="18" charset="0"/>
               </a:rPr>
-              <a:t> Aims and objectives</a:t>
+              <a:t> Objectives</a:t>
             </a:r>
           </a:p>
           <a:p>
@@ -17544,8 +17538,12 @@
               <a:buChar char="§"/>
             </a:pPr>
             <a:r>
+              <a:rPr lang="en-US" sz="1200" i="1" dirty="0"/>
+              <a:t>Authors</a:t>
+            </a:r>
+            <a:r>
               <a:rPr lang="en-US" sz="1200" dirty="0"/>
-              <a:t>Authors: Fei Yan,  Josef </a:t>
+              <a:t>: Fei Yan,  Josef </a:t>
             </a:r>
             <a:r>
               <a:rPr lang="en-US" sz="1200" dirty="0" err="1"/>
@@ -20279,54 +20277,6 @@
                 <a:ea typeface="Calibri" panose="020F0502020204030204" pitchFamily="34" charset="0"/>
                 <a:cs typeface="Times New Roman" panose="02020603050405020304" pitchFamily="18" charset="0"/>
               </a:rPr>
-              <a:t>Aims</a:t>
-            </a:r>
-            <a:r>
-              <a:rPr lang="pt-PT" dirty="0">
-                <a:solidFill>
-                  <a:schemeClr val="bg1"/>
-                </a:solidFill>
-                <a:effectLst/>
-                <a:latin typeface="Calibri" panose="020F0502020204030204" pitchFamily="34" charset="0"/>
-                <a:ea typeface="Calibri" panose="020F0502020204030204" pitchFamily="34" charset="0"/>
-                <a:cs typeface="Times New Roman" panose="02020603050405020304" pitchFamily="18" charset="0"/>
-              </a:rPr>
-              <a:t> </a:t>
-            </a:r>
-            <a:r>
-              <a:rPr lang="pt-PT" dirty="0" err="1">
-                <a:solidFill>
-                  <a:schemeClr val="bg1"/>
-                </a:solidFill>
-                <a:effectLst/>
-                <a:latin typeface="Calibri" panose="020F0502020204030204" pitchFamily="34" charset="0"/>
-                <a:ea typeface="Calibri" panose="020F0502020204030204" pitchFamily="34" charset="0"/>
-                <a:cs typeface="Times New Roman" panose="02020603050405020304" pitchFamily="18" charset="0"/>
-              </a:rPr>
-              <a:t>and</a:t>
-            </a:r>
-            <a:r>
-              <a:rPr lang="pt-PT" dirty="0">
-                <a:solidFill>
-                  <a:schemeClr val="bg1"/>
-                </a:solidFill>
-                <a:effectLst/>
-                <a:latin typeface="Calibri" panose="020F0502020204030204" pitchFamily="34" charset="0"/>
-                <a:ea typeface="Calibri" panose="020F0502020204030204" pitchFamily="34" charset="0"/>
-                <a:cs typeface="Times New Roman" panose="02020603050405020304" pitchFamily="18" charset="0"/>
-              </a:rPr>
-              <a:t> </a:t>
-            </a:r>
-            <a:r>
-              <a:rPr lang="pt-PT" dirty="0" err="1">
-                <a:solidFill>
-                  <a:schemeClr val="bg1"/>
-                </a:solidFill>
-                <a:effectLst/>
-                <a:latin typeface="Calibri" panose="020F0502020204030204" pitchFamily="34" charset="0"/>
-                <a:ea typeface="Calibri" panose="020F0502020204030204" pitchFamily="34" charset="0"/>
-                <a:cs typeface="Times New Roman" panose="02020603050405020304" pitchFamily="18" charset="0"/>
-              </a:rPr>
               <a:t>Objectives</a:t>
             </a:r>
             <a:br>
@@ -21277,54 +21227,6 @@
                 <a:cs typeface="Times New Roman" panose="02020603050405020304" pitchFamily="18" charset="0"/>
               </a:rPr>
               <a:t>Goals</a:t>
-            </a:r>
-            <a:r>
-              <a:rPr lang="pt-PT" sz="4400" dirty="0">
-                <a:solidFill>
-                  <a:schemeClr val="bg1"/>
-                </a:solidFill>
-                <a:effectLst/>
-                <a:latin typeface="Calibri" panose="020F0502020204030204" pitchFamily="34" charset="0"/>
-                <a:ea typeface="Calibri" panose="020F0502020204030204" pitchFamily="34" charset="0"/>
-                <a:cs typeface="Times New Roman" panose="02020603050405020304" pitchFamily="18" charset="0"/>
-              </a:rPr>
-              <a:t> to </a:t>
-            </a:r>
-            <a:r>
-              <a:rPr lang="pt-PT" sz="4400" dirty="0" err="1">
-                <a:solidFill>
-                  <a:schemeClr val="bg1"/>
-                </a:solidFill>
-                <a:effectLst/>
-                <a:latin typeface="Calibri" panose="020F0502020204030204" pitchFamily="34" charset="0"/>
-                <a:ea typeface="Calibri" panose="020F0502020204030204" pitchFamily="34" charset="0"/>
-                <a:cs typeface="Times New Roman" panose="02020603050405020304" pitchFamily="18" charset="0"/>
-              </a:rPr>
-              <a:t>be</a:t>
-            </a:r>
-            <a:r>
-              <a:rPr lang="pt-PT" sz="4400" dirty="0">
-                <a:solidFill>
-                  <a:schemeClr val="bg1"/>
-                </a:solidFill>
-                <a:effectLst/>
-                <a:latin typeface="Calibri" panose="020F0502020204030204" pitchFamily="34" charset="0"/>
-                <a:ea typeface="Calibri" panose="020F0502020204030204" pitchFamily="34" charset="0"/>
-                <a:cs typeface="Times New Roman" panose="02020603050405020304" pitchFamily="18" charset="0"/>
-              </a:rPr>
-              <a:t> </a:t>
-            </a:r>
-            <a:r>
-              <a:rPr lang="pt-PT" sz="4400" dirty="0" err="1">
-                <a:solidFill>
-                  <a:schemeClr val="bg1"/>
-                </a:solidFill>
-                <a:effectLst/>
-                <a:latin typeface="Calibri" panose="020F0502020204030204" pitchFamily="34" charset="0"/>
-                <a:ea typeface="Calibri" panose="020F0502020204030204" pitchFamily="34" charset="0"/>
-                <a:cs typeface="Times New Roman" panose="02020603050405020304" pitchFamily="18" charset="0"/>
-              </a:rPr>
-              <a:t>achieved</a:t>
             </a:r>
             <a:br>
               <a:rPr lang="pt-PT" sz="1800" dirty="0">

</xml_diff>